<commit_message>
compiler for modules decouple
</commit_message>
<xml_diff>
--- a/docs/workflow.pptx
+++ b/docs/workflow.pptx
@@ -7864,6 +7864,365 @@
           <a:chExt cx="0" cy="0"/>
         </a:xfrm>
       </p:grpSpPr>
+      <p:grpSp>
+        <p:nvGrpSpPr>
+          <p:cNvPr id="10" name="Group 9"/>
+          <p:cNvGrpSpPr/>
+          <p:nvPr/>
+        </p:nvGrpSpPr>
+        <p:grpSpPr>
+          <a:xfrm>
+            <a:off x="467544" y="764704"/>
+            <a:ext cx="7992888" cy="2736304"/>
+            <a:chOff x="467544" y="764704"/>
+            <a:chExt cx="7992888" cy="2736304"/>
+          </a:xfrm>
+        </p:grpSpPr>
+        <p:sp>
+          <p:nvSpPr>
+            <p:cNvPr id="2" name="Rectangle 1"/>
+            <p:cNvSpPr/>
+            <p:nvPr/>
+          </p:nvSpPr>
+          <p:spPr>
+            <a:xfrm>
+              <a:off x="467544" y="1628800"/>
+              <a:ext cx="1872208" cy="864096"/>
+            </a:xfrm>
+            <a:prstGeom prst="rect">
+              <a:avLst/>
+            </a:prstGeom>
+          </p:spPr>
+          <p:style>
+            <a:lnRef idx="1">
+              <a:schemeClr val="accent1"/>
+            </a:lnRef>
+            <a:fillRef idx="3">
+              <a:schemeClr val="accent1"/>
+            </a:fillRef>
+            <a:effectRef idx="2">
+              <a:schemeClr val="accent1"/>
+            </a:effectRef>
+            <a:fontRef idx="minor">
+              <a:schemeClr val="lt1"/>
+            </a:fontRef>
+          </p:style>
+          <p:txBody>
+            <a:bodyPr rtlCol="0" anchor="ctr"/>
+            <a:lstStyle/>
+            <a:p>
+              <a:pPr algn="ctr"/>
+              <a:r>
+                <a:rPr lang="en-US" dirty="0" smtClean="0"/>
+                <a:t>Compiler</a:t>
+              </a:r>
+            </a:p>
+          </p:txBody>
+        </p:sp>
+        <p:sp>
+          <p:nvSpPr>
+            <p:cNvPr id="3" name="Rectangle 2"/>
+            <p:cNvSpPr/>
+            <p:nvPr/>
+          </p:nvSpPr>
+          <p:spPr>
+            <a:xfrm>
+              <a:off x="3563888" y="1628800"/>
+              <a:ext cx="1872208" cy="864096"/>
+            </a:xfrm>
+            <a:prstGeom prst="rect">
+              <a:avLst/>
+            </a:prstGeom>
+          </p:spPr>
+          <p:style>
+            <a:lnRef idx="1">
+              <a:schemeClr val="accent1"/>
+            </a:lnRef>
+            <a:fillRef idx="3">
+              <a:schemeClr val="accent1"/>
+            </a:fillRef>
+            <a:effectRef idx="2">
+              <a:schemeClr val="accent1"/>
+            </a:effectRef>
+            <a:fontRef idx="minor">
+              <a:schemeClr val="lt1"/>
+            </a:fontRef>
+          </p:style>
+          <p:txBody>
+            <a:bodyPr rtlCol="0" anchor="ctr"/>
+            <a:lstStyle/>
+            <a:p>
+              <a:pPr algn="ctr"/>
+              <a:r>
+                <a:rPr lang="en-US" dirty="0" smtClean="0"/>
+                <a:t>Model</a:t>
+              </a:r>
+            </a:p>
+          </p:txBody>
+        </p:sp>
+        <p:sp>
+          <p:nvSpPr>
+            <p:cNvPr id="4" name="Rectangle 3"/>
+            <p:cNvSpPr/>
+            <p:nvPr/>
+          </p:nvSpPr>
+          <p:spPr>
+            <a:xfrm>
+              <a:off x="6588224" y="764704"/>
+              <a:ext cx="1872208" cy="864096"/>
+            </a:xfrm>
+            <a:prstGeom prst="rect">
+              <a:avLst/>
+            </a:prstGeom>
+          </p:spPr>
+          <p:style>
+            <a:lnRef idx="1">
+              <a:schemeClr val="accent1"/>
+            </a:lnRef>
+            <a:fillRef idx="3">
+              <a:schemeClr val="accent1"/>
+            </a:fillRef>
+            <a:effectRef idx="2">
+              <a:schemeClr val="accent1"/>
+            </a:effectRef>
+            <a:fontRef idx="minor">
+              <a:schemeClr val="lt1"/>
+            </a:fontRef>
+          </p:style>
+          <p:txBody>
+            <a:bodyPr rtlCol="0" anchor="ctr"/>
+            <a:lstStyle/>
+            <a:p>
+              <a:pPr algn="ctr"/>
+              <a:r>
+                <a:rPr lang="en-US" dirty="0" smtClean="0"/>
+                <a:t>Markup Language</a:t>
+              </a:r>
+            </a:p>
+          </p:txBody>
+        </p:sp>
+        <p:sp>
+          <p:nvSpPr>
+            <p:cNvPr id="5" name="Rectangle 4"/>
+            <p:cNvSpPr/>
+            <p:nvPr/>
+          </p:nvSpPr>
+          <p:spPr>
+            <a:xfrm>
+              <a:off x="6588224" y="2636912"/>
+              <a:ext cx="1872208" cy="864096"/>
+            </a:xfrm>
+            <a:prstGeom prst="rect">
+              <a:avLst/>
+            </a:prstGeom>
+          </p:spPr>
+          <p:style>
+            <a:lnRef idx="1">
+              <a:schemeClr val="accent1"/>
+            </a:lnRef>
+            <a:fillRef idx="3">
+              <a:schemeClr val="accent1"/>
+            </a:fillRef>
+            <a:effectRef idx="2">
+              <a:schemeClr val="accent1"/>
+            </a:effectRef>
+            <a:fontRef idx="minor">
+              <a:schemeClr val="lt1"/>
+            </a:fontRef>
+          </p:style>
+          <p:txBody>
+            <a:bodyPr rtlCol="0" anchor="ctr"/>
+            <a:lstStyle/>
+            <a:p>
+              <a:pPr algn="ctr"/>
+              <a:r>
+                <a:rPr lang="en-US" dirty="0" smtClean="0"/>
+                <a:t>Tabular</a:t>
+              </a:r>
+            </a:p>
+          </p:txBody>
+        </p:sp>
+        <p:sp>
+          <p:nvSpPr>
+            <p:cNvPr id="6" name="Right Arrow 5"/>
+            <p:cNvSpPr/>
+            <p:nvPr/>
+          </p:nvSpPr>
+          <p:spPr>
+            <a:xfrm>
+              <a:off x="2498620" y="1700808"/>
+              <a:ext cx="978408" cy="602356"/>
+            </a:xfrm>
+            <a:prstGeom prst="rightArrow">
+              <a:avLst/>
+            </a:prstGeom>
+          </p:spPr>
+          <p:style>
+            <a:lnRef idx="1">
+              <a:schemeClr val="accent3"/>
+            </a:lnRef>
+            <a:fillRef idx="3">
+              <a:schemeClr val="accent3"/>
+            </a:fillRef>
+            <a:effectRef idx="2">
+              <a:schemeClr val="accent3"/>
+            </a:effectRef>
+            <a:fontRef idx="minor">
+              <a:schemeClr val="lt1"/>
+            </a:fontRef>
+          </p:style>
+          <p:txBody>
+            <a:bodyPr rtlCol="0" anchor="ctr"/>
+            <a:lstStyle/>
+            <a:p>
+              <a:pPr algn="ctr"/>
+              <a:endParaRPr lang="en-US"/>
+            </a:p>
+          </p:txBody>
+        </p:sp>
+        <p:sp>
+          <p:nvSpPr>
+            <p:cNvPr id="7" name="Right Arrow 6"/>
+            <p:cNvSpPr/>
+            <p:nvPr/>
+          </p:nvSpPr>
+          <p:spPr>
+            <a:xfrm rot="19889276">
+              <a:off x="5607388" y="1261502"/>
+              <a:ext cx="978408" cy="602356"/>
+            </a:xfrm>
+            <a:prstGeom prst="rightArrow">
+              <a:avLst/>
+            </a:prstGeom>
+          </p:spPr>
+          <p:style>
+            <a:lnRef idx="1">
+              <a:schemeClr val="accent3"/>
+            </a:lnRef>
+            <a:fillRef idx="3">
+              <a:schemeClr val="accent3"/>
+            </a:fillRef>
+            <a:effectRef idx="2">
+              <a:schemeClr val="accent3"/>
+            </a:effectRef>
+            <a:fontRef idx="minor">
+              <a:schemeClr val="lt1"/>
+            </a:fontRef>
+          </p:style>
+          <p:txBody>
+            <a:bodyPr rtlCol="0" anchor="ctr"/>
+            <a:lstStyle/>
+            <a:p>
+              <a:pPr algn="ctr"/>
+              <a:endParaRPr lang="en-US"/>
+            </a:p>
+          </p:txBody>
+        </p:sp>
+        <p:sp>
+          <p:nvSpPr>
+            <p:cNvPr id="8" name="Right Arrow 7"/>
+            <p:cNvSpPr/>
+            <p:nvPr/>
+          </p:nvSpPr>
+          <p:spPr>
+            <a:xfrm rot="2106395">
+              <a:off x="5607166" y="2335734"/>
+              <a:ext cx="978408" cy="602356"/>
+            </a:xfrm>
+            <a:prstGeom prst="rightArrow">
+              <a:avLst/>
+            </a:prstGeom>
+          </p:spPr>
+          <p:style>
+            <a:lnRef idx="1">
+              <a:schemeClr val="accent3"/>
+            </a:lnRef>
+            <a:fillRef idx="3">
+              <a:schemeClr val="accent3"/>
+            </a:fillRef>
+            <a:effectRef idx="2">
+              <a:schemeClr val="accent3"/>
+            </a:effectRef>
+            <a:fontRef idx="minor">
+              <a:schemeClr val="lt1"/>
+            </a:fontRef>
+          </p:style>
+          <p:txBody>
+            <a:bodyPr rtlCol="0" anchor="ctr"/>
+            <a:lstStyle/>
+            <a:p>
+              <a:pPr algn="ctr"/>
+              <a:endParaRPr lang="en-US"/>
+            </a:p>
+          </p:txBody>
+        </p:sp>
+        <p:sp>
+          <p:nvSpPr>
+            <p:cNvPr id="9" name="Rounded Rectangular Callout 8"/>
+            <p:cNvSpPr/>
+            <p:nvPr/>
+          </p:nvSpPr>
+          <p:spPr>
+            <a:xfrm>
+              <a:off x="1547664" y="2625213"/>
+              <a:ext cx="2473424" cy="875795"/>
+            </a:xfrm>
+            <a:prstGeom prst="wedgeRoundRectCallout">
+              <a:avLst>
+                <a:gd name="adj1" fmla="val 8929"/>
+                <a:gd name="adj2" fmla="val -85992"/>
+                <a:gd name="adj3" fmla="val 16667"/>
+              </a:avLst>
+            </a:prstGeom>
+          </p:spPr>
+          <p:style>
+            <a:lnRef idx="1">
+              <a:schemeClr val="accent2"/>
+            </a:lnRef>
+            <a:fillRef idx="3">
+              <a:schemeClr val="accent2"/>
+            </a:fillRef>
+            <a:effectRef idx="2">
+              <a:schemeClr val="accent2"/>
+            </a:effectRef>
+            <a:fontRef idx="minor">
+              <a:schemeClr val="lt1"/>
+            </a:fontRef>
+          </p:style>
+          <p:txBody>
+            <a:bodyPr rtlCol="0" anchor="ctr"/>
+            <a:lstStyle/>
+            <a:p>
+              <a:pPr algn="ctr"/>
+              <a:r>
+                <a:rPr lang="zh-CN" altLang="en-US" sz="1600" dirty="0" smtClean="0">
+                  <a:latin typeface="微软雅黑" panose="020B0503020204020204" pitchFamily="34" charset="-122"/>
+                  <a:ea typeface="微软雅黑" panose="020B0503020204020204" pitchFamily="34" charset="-122"/>
+                </a:rPr>
+                <a:t>在这里将引擎模块与</a:t>
+              </a:r>
+              <a:r>
+                <a:rPr lang="en-US" altLang="zh-CN" sz="1600" dirty="0" smtClean="0">
+                  <a:latin typeface="微软雅黑" panose="020B0503020204020204" pitchFamily="34" charset="-122"/>
+                  <a:ea typeface="微软雅黑" panose="020B0503020204020204" pitchFamily="34" charset="-122"/>
+                </a:rPr>
+                <a:t>GCModeller</a:t>
+              </a:r>
+              <a:r>
+                <a:rPr lang="zh-CN" altLang="en-US" sz="1600" dirty="0" smtClean="0">
+                  <a:latin typeface="微软雅黑" panose="020B0503020204020204" pitchFamily="34" charset="-122"/>
+                  <a:ea typeface="微软雅黑" panose="020B0503020204020204" pitchFamily="34" charset="-122"/>
+                </a:rPr>
+                <a:t>的其他基础模块进行解耦和</a:t>
+              </a:r>
+              <a:endParaRPr lang="en-US" sz="1600" dirty="0">
+                <a:latin typeface="微软雅黑" panose="020B0503020204020204" pitchFamily="34" charset="-122"/>
+                <a:ea typeface="微软雅黑" panose="020B0503020204020204" pitchFamily="34" charset="-122"/>
+              </a:endParaRPr>
+            </a:p>
+          </p:txBody>
+        </p:sp>
+      </p:grpSp>
     </p:spTree>
     <p:extLst>
       <p:ext uri="{BB962C8B-B14F-4D97-AF65-F5344CB8AC3E}">

</xml_diff>